<commit_message>
Se inicio el modulo producto, por concluir
</commit_message>
<xml_diff>
--- a/Imagenes/Presentación1.pptx
+++ b/Imagenes/Presentación1.pptx
@@ -265,7 +265,7 @@
           <a:p>
             <a:fld id="{A66B3BA8-A8F7-4478-9A37-C6CA7EF2C81B}" type="datetimeFigureOut">
               <a:rPr lang="es-HN" smtClean="0"/>
-              <a:t>19/6/2021</a:t>
+              <a:t>25/6/2021</a:t>
             </a:fld>
             <a:endParaRPr lang="es-HN"/>
           </a:p>
@@ -465,7 +465,7 @@
           <a:p>
             <a:fld id="{A66B3BA8-A8F7-4478-9A37-C6CA7EF2C81B}" type="datetimeFigureOut">
               <a:rPr lang="es-HN" smtClean="0"/>
-              <a:t>19/6/2021</a:t>
+              <a:t>25/6/2021</a:t>
             </a:fld>
             <a:endParaRPr lang="es-HN"/>
           </a:p>
@@ -675,7 +675,7 @@
           <a:p>
             <a:fld id="{A66B3BA8-A8F7-4478-9A37-C6CA7EF2C81B}" type="datetimeFigureOut">
               <a:rPr lang="es-HN" smtClean="0"/>
-              <a:t>19/6/2021</a:t>
+              <a:t>25/6/2021</a:t>
             </a:fld>
             <a:endParaRPr lang="es-HN"/>
           </a:p>
@@ -875,7 +875,7 @@
           <a:p>
             <a:fld id="{A66B3BA8-A8F7-4478-9A37-C6CA7EF2C81B}" type="datetimeFigureOut">
               <a:rPr lang="es-HN" smtClean="0"/>
-              <a:t>19/6/2021</a:t>
+              <a:t>25/6/2021</a:t>
             </a:fld>
             <a:endParaRPr lang="es-HN"/>
           </a:p>
@@ -1151,7 +1151,7 @@
           <a:p>
             <a:fld id="{A66B3BA8-A8F7-4478-9A37-C6CA7EF2C81B}" type="datetimeFigureOut">
               <a:rPr lang="es-HN" smtClean="0"/>
-              <a:t>19/6/2021</a:t>
+              <a:t>25/6/2021</a:t>
             </a:fld>
             <a:endParaRPr lang="es-HN"/>
           </a:p>
@@ -1419,7 +1419,7 @@
           <a:p>
             <a:fld id="{A66B3BA8-A8F7-4478-9A37-C6CA7EF2C81B}" type="datetimeFigureOut">
               <a:rPr lang="es-HN" smtClean="0"/>
-              <a:t>19/6/2021</a:t>
+              <a:t>25/6/2021</a:t>
             </a:fld>
             <a:endParaRPr lang="es-HN"/>
           </a:p>
@@ -1834,7 +1834,7 @@
           <a:p>
             <a:fld id="{A66B3BA8-A8F7-4478-9A37-C6CA7EF2C81B}" type="datetimeFigureOut">
               <a:rPr lang="es-HN" smtClean="0"/>
-              <a:t>19/6/2021</a:t>
+              <a:t>25/6/2021</a:t>
             </a:fld>
             <a:endParaRPr lang="es-HN"/>
           </a:p>
@@ -1976,7 +1976,7 @@
           <a:p>
             <a:fld id="{A66B3BA8-A8F7-4478-9A37-C6CA7EF2C81B}" type="datetimeFigureOut">
               <a:rPr lang="es-HN" smtClean="0"/>
-              <a:t>19/6/2021</a:t>
+              <a:t>25/6/2021</a:t>
             </a:fld>
             <a:endParaRPr lang="es-HN"/>
           </a:p>
@@ -2089,7 +2089,7 @@
           <a:p>
             <a:fld id="{A66B3BA8-A8F7-4478-9A37-C6CA7EF2C81B}" type="datetimeFigureOut">
               <a:rPr lang="es-HN" smtClean="0"/>
-              <a:t>19/6/2021</a:t>
+              <a:t>25/6/2021</a:t>
             </a:fld>
             <a:endParaRPr lang="es-HN"/>
           </a:p>
@@ -2402,7 +2402,7 @@
           <a:p>
             <a:fld id="{A66B3BA8-A8F7-4478-9A37-C6CA7EF2C81B}" type="datetimeFigureOut">
               <a:rPr lang="es-HN" smtClean="0"/>
-              <a:t>19/6/2021</a:t>
+              <a:t>25/6/2021</a:t>
             </a:fld>
             <a:endParaRPr lang="es-HN"/>
           </a:p>
@@ -2691,7 +2691,7 @@
           <a:p>
             <a:fld id="{A66B3BA8-A8F7-4478-9A37-C6CA7EF2C81B}" type="datetimeFigureOut">
               <a:rPr lang="es-HN" smtClean="0"/>
-              <a:t>19/6/2021</a:t>
+              <a:t>25/6/2021</a:t>
             </a:fld>
             <a:endParaRPr lang="es-HN"/>
           </a:p>
@@ -2934,7 +2934,7 @@
           <a:p>
             <a:fld id="{A66B3BA8-A8F7-4478-9A37-C6CA7EF2C81B}" type="datetimeFigureOut">
               <a:rPr lang="es-HN" smtClean="0"/>
-              <a:t>19/6/2021</a:t>
+              <a:t>25/6/2021</a:t>
             </a:fld>
             <a:endParaRPr lang="es-HN"/>
           </a:p>
@@ -4093,10 +4093,10 @@
             <a:p>
               <a:pPr algn="ctr"/>
               <a:r>
-                <a:rPr lang="en-US" sz="3200" b="1" dirty="0">
+                <a:rPr lang="en-US" sz="3200" b="1" dirty="0" err="1">
                   <a:latin typeface="Trajan Pro" panose="02020502050506020301" pitchFamily="18" charset="0"/>
                 </a:rPr>
-                <a:t>Persona</a:t>
+                <a:t>producto</a:t>
               </a:r>
               <a:endParaRPr lang="es-HN" sz="3200" b="1" dirty="0">
                 <a:latin typeface="Trajan Pro" panose="02020502050506020301" pitchFamily="18" charset="0"/>

</xml_diff>

<commit_message>
Terminado Modulo proyecto, reporte de presupuesto, Formulario seleccion de Detalles
</commit_message>
<xml_diff>
--- a/Imagenes/Presentación1.pptx
+++ b/Imagenes/Presentación1.pptx
@@ -265,7 +265,7 @@
           <a:p>
             <a:fld id="{A66B3BA8-A8F7-4478-9A37-C6CA7EF2C81B}" type="datetimeFigureOut">
               <a:rPr lang="es-HN" smtClean="0"/>
-              <a:t>28/6/2021</a:t>
+              <a:t>2/7/2021</a:t>
             </a:fld>
             <a:endParaRPr lang="es-HN"/>
           </a:p>
@@ -465,7 +465,7 @@
           <a:p>
             <a:fld id="{A66B3BA8-A8F7-4478-9A37-C6CA7EF2C81B}" type="datetimeFigureOut">
               <a:rPr lang="es-HN" smtClean="0"/>
-              <a:t>28/6/2021</a:t>
+              <a:t>2/7/2021</a:t>
             </a:fld>
             <a:endParaRPr lang="es-HN"/>
           </a:p>
@@ -675,7 +675,7 @@
           <a:p>
             <a:fld id="{A66B3BA8-A8F7-4478-9A37-C6CA7EF2C81B}" type="datetimeFigureOut">
               <a:rPr lang="es-HN" smtClean="0"/>
-              <a:t>28/6/2021</a:t>
+              <a:t>2/7/2021</a:t>
             </a:fld>
             <a:endParaRPr lang="es-HN"/>
           </a:p>
@@ -875,7 +875,7 @@
           <a:p>
             <a:fld id="{A66B3BA8-A8F7-4478-9A37-C6CA7EF2C81B}" type="datetimeFigureOut">
               <a:rPr lang="es-HN" smtClean="0"/>
-              <a:t>28/6/2021</a:t>
+              <a:t>2/7/2021</a:t>
             </a:fld>
             <a:endParaRPr lang="es-HN"/>
           </a:p>
@@ -1151,7 +1151,7 @@
           <a:p>
             <a:fld id="{A66B3BA8-A8F7-4478-9A37-C6CA7EF2C81B}" type="datetimeFigureOut">
               <a:rPr lang="es-HN" smtClean="0"/>
-              <a:t>28/6/2021</a:t>
+              <a:t>2/7/2021</a:t>
             </a:fld>
             <a:endParaRPr lang="es-HN"/>
           </a:p>
@@ -1419,7 +1419,7 @@
           <a:p>
             <a:fld id="{A66B3BA8-A8F7-4478-9A37-C6CA7EF2C81B}" type="datetimeFigureOut">
               <a:rPr lang="es-HN" smtClean="0"/>
-              <a:t>28/6/2021</a:t>
+              <a:t>2/7/2021</a:t>
             </a:fld>
             <a:endParaRPr lang="es-HN"/>
           </a:p>
@@ -1834,7 +1834,7 @@
           <a:p>
             <a:fld id="{A66B3BA8-A8F7-4478-9A37-C6CA7EF2C81B}" type="datetimeFigureOut">
               <a:rPr lang="es-HN" smtClean="0"/>
-              <a:t>28/6/2021</a:t>
+              <a:t>2/7/2021</a:t>
             </a:fld>
             <a:endParaRPr lang="es-HN"/>
           </a:p>
@@ -1976,7 +1976,7 @@
           <a:p>
             <a:fld id="{A66B3BA8-A8F7-4478-9A37-C6CA7EF2C81B}" type="datetimeFigureOut">
               <a:rPr lang="es-HN" smtClean="0"/>
-              <a:t>28/6/2021</a:t>
+              <a:t>2/7/2021</a:t>
             </a:fld>
             <a:endParaRPr lang="es-HN"/>
           </a:p>
@@ -2089,7 +2089,7 @@
           <a:p>
             <a:fld id="{A66B3BA8-A8F7-4478-9A37-C6CA7EF2C81B}" type="datetimeFigureOut">
               <a:rPr lang="es-HN" smtClean="0"/>
-              <a:t>28/6/2021</a:t>
+              <a:t>2/7/2021</a:t>
             </a:fld>
             <a:endParaRPr lang="es-HN"/>
           </a:p>
@@ -2402,7 +2402,7 @@
           <a:p>
             <a:fld id="{A66B3BA8-A8F7-4478-9A37-C6CA7EF2C81B}" type="datetimeFigureOut">
               <a:rPr lang="es-HN" smtClean="0"/>
-              <a:t>28/6/2021</a:t>
+              <a:t>2/7/2021</a:t>
             </a:fld>
             <a:endParaRPr lang="es-HN"/>
           </a:p>
@@ -2691,7 +2691,7 @@
           <a:p>
             <a:fld id="{A66B3BA8-A8F7-4478-9A37-C6CA7EF2C81B}" type="datetimeFigureOut">
               <a:rPr lang="es-HN" smtClean="0"/>
-              <a:t>28/6/2021</a:t>
+              <a:t>2/7/2021</a:t>
             </a:fld>
             <a:endParaRPr lang="es-HN"/>
           </a:p>
@@ -2934,7 +2934,7 @@
           <a:p>
             <a:fld id="{A66B3BA8-A8F7-4478-9A37-C6CA7EF2C81B}" type="datetimeFigureOut">
               <a:rPr lang="es-HN" smtClean="0"/>
-              <a:t>28/6/2021</a:t>
+              <a:t>2/7/2021</a:t>
             </a:fld>
             <a:endParaRPr lang="es-HN"/>
           </a:p>
@@ -3839,7 +3839,7 @@
         </p:blipFill>
         <p:spPr>
           <a:xfrm>
-            <a:off x="2216047" y="679450"/>
+            <a:off x="7101812" y="-152580"/>
             <a:ext cx="4891315" cy="6045199"/>
           </a:xfrm>
           <a:prstGeom prst="rect">
@@ -3861,7 +3861,7 @@
         </p:nvGrpSpPr>
         <p:grpSpPr>
           <a:xfrm>
-            <a:off x="3288768" y="1466491"/>
+            <a:off x="7762156" y="561056"/>
             <a:ext cx="3338423" cy="3541742"/>
             <a:chOff x="3288768" y="1466491"/>
             <a:chExt cx="3338423" cy="3541742"/>
@@ -3955,6 +3955,144 @@
                 <a:t>SIPRES</a:t>
               </a:r>
               <a:endParaRPr lang="es-HN" sz="4000" b="1" dirty="0">
+                <a:latin typeface="Trajan Pro" panose="02020502050506020301" pitchFamily="18" charset="0"/>
+              </a:endParaRPr>
+            </a:p>
+          </p:txBody>
+        </p:sp>
+      </p:grpSp>
+      <p:grpSp>
+        <p:nvGrpSpPr>
+          <p:cNvPr id="7" name="Grupo 6">
+            <a:extLst>
+              <a:ext uri="{FF2B5EF4-FFF2-40B4-BE49-F238E27FC236}">
+                <a16:creationId xmlns:a16="http://schemas.microsoft.com/office/drawing/2014/main" id="{865D49E4-AB4A-45E1-8755-A1D41C27CDDF}"/>
+              </a:ext>
+            </a:extLst>
+          </p:cNvPr>
+          <p:cNvGrpSpPr/>
+          <p:nvPr/>
+        </p:nvGrpSpPr>
+        <p:grpSpPr>
+          <a:xfrm>
+            <a:off x="198873" y="1206514"/>
+            <a:ext cx="3338423" cy="3541742"/>
+            <a:chOff x="3288768" y="1466491"/>
+            <a:chExt cx="3338423" cy="3541742"/>
+          </a:xfrm>
+        </p:grpSpPr>
+        <p:pic>
+          <p:nvPicPr>
+            <p:cNvPr id="8" name="Imagen 7">
+              <a:extLst>
+                <a:ext uri="{FF2B5EF4-FFF2-40B4-BE49-F238E27FC236}">
+                  <a16:creationId xmlns:a16="http://schemas.microsoft.com/office/drawing/2014/main" id="{742BC5C5-1391-4554-9940-AA63D32B7975}"/>
+                </a:ext>
+              </a:extLst>
+            </p:cNvPr>
+            <p:cNvPicPr>
+              <a:picLocks noChangeAspect="1"/>
+            </p:cNvPicPr>
+            <p:nvPr/>
+          </p:nvPicPr>
+          <p:blipFill rotWithShape="1">
+            <a:blip r:embed="rId3">
+              <a:extLst>
+                <a:ext uri="{28A0092B-C50C-407E-A947-70E740481C1C}">
+                  <a14:useLocalDpi xmlns:a14="http://schemas.microsoft.com/office/drawing/2010/main" val="0"/>
+                </a:ext>
+              </a:extLst>
+            </a:blip>
+            <a:srcRect b="15916"/>
+            <a:stretch/>
+          </p:blipFill>
+          <p:spPr>
+            <a:xfrm>
+              <a:off x="3288768" y="1466491"/>
+              <a:ext cx="3338423" cy="2807059"/>
+            </a:xfrm>
+            <a:prstGeom prst="rect">
+              <a:avLst/>
+            </a:prstGeom>
+          </p:spPr>
+        </p:pic>
+        <p:sp>
+          <p:nvSpPr>
+            <p:cNvPr id="9" name="Rectángulo 8">
+              <a:extLst>
+                <a:ext uri="{FF2B5EF4-FFF2-40B4-BE49-F238E27FC236}">
+                  <a16:creationId xmlns:a16="http://schemas.microsoft.com/office/drawing/2014/main" id="{A024EC10-7A28-42E4-A190-1A6E45D8137F}"/>
+                </a:ext>
+              </a:extLst>
+            </p:cNvPr>
+            <p:cNvSpPr/>
+            <p:nvPr/>
+          </p:nvSpPr>
+          <p:spPr>
+            <a:xfrm>
+              <a:off x="3327586" y="4223230"/>
+              <a:ext cx="3260785" cy="785003"/>
+            </a:xfrm>
+            <a:prstGeom prst="rect">
+              <a:avLst/>
+            </a:prstGeom>
+            <a:noFill/>
+            <a:ln>
+              <a:noFill/>
+            </a:ln>
+          </p:spPr>
+          <p:style>
+            <a:lnRef idx="2">
+              <a:schemeClr val="accent1">
+                <a:shade val="50000"/>
+              </a:schemeClr>
+            </a:lnRef>
+            <a:fillRef idx="1">
+              <a:schemeClr val="accent1"/>
+            </a:fillRef>
+            <a:effectRef idx="0">
+              <a:schemeClr val="accent1"/>
+            </a:effectRef>
+            <a:fontRef idx="minor">
+              <a:schemeClr val="lt1"/>
+            </a:fontRef>
+          </p:style>
+          <p:txBody>
+            <a:bodyPr rtlCol="0" anchor="ctr"/>
+            <a:lstStyle/>
+            <a:p>
+              <a:pPr algn="ctr"/>
+              <a:r>
+                <a:rPr lang="en-US" sz="4000" b="1" dirty="0">
+                  <a:ln>
+                    <a:solidFill>
+                      <a:schemeClr val="tx2">
+                        <a:lumMod val="50000"/>
+                      </a:schemeClr>
+                    </a:solidFill>
+                  </a:ln>
+                  <a:solidFill>
+                    <a:schemeClr val="accent1">
+                      <a:lumMod val="50000"/>
+                    </a:schemeClr>
+                  </a:solidFill>
+                  <a:latin typeface="Trajan Pro" panose="02020502050506020301" pitchFamily="18" charset="0"/>
+                </a:rPr>
+                <a:t>SIPRES</a:t>
+              </a:r>
+              <a:endParaRPr lang="es-HN" sz="4000" b="1" dirty="0">
+                <a:ln>
+                  <a:solidFill>
+                    <a:schemeClr val="tx2">
+                      <a:lumMod val="50000"/>
+                    </a:schemeClr>
+                  </a:solidFill>
+                </a:ln>
+                <a:solidFill>
+                  <a:schemeClr val="accent1">
+                    <a:lumMod val="50000"/>
+                  </a:schemeClr>
+                </a:solidFill>
                 <a:latin typeface="Trajan Pro" panose="02020502050506020301" pitchFamily="18" charset="0"/>
               </a:endParaRPr>
             </a:p>

</xml_diff>